<commit_message>
documentation for summarization, updated diagrams, return FetchTranscript arn in main stack output.
</commit_message>
<xml_diff>
--- a/images/architecture-diagram.pptx
+++ b/images/architecture-diagram.pptx
@@ -104,6 +104,11 @@
       </a:defRPr>
     </a:lvl9pPr>
   </p:defaultTextStyle>
+  <p:extLst>
+    <p:ext uri="{EFAFB233-063F-42B5-8137-9DF3F51BA10A}">
+      <p15:sldGuideLst xmlns:p15="http://schemas.microsoft.com/office/powerpoint/2012/main"/>
+    </p:ext>
+  </p:extLst>
 </p:presentation>
 </file>
 
@@ -238,7 +243,7 @@
           <a:p>
             <a:fld id="{5B95B4D6-F152-DB46-AA14-3BFE3FA9C9B0}" type="datetimeFigureOut">
               <a:rPr lang="en-US" smtClean="0"/>
-              <a:t>7/28/22</a:t>
+              <a:t>6/7/23</a:t>
             </a:fld>
             <a:endParaRPr lang="en-US"/>
           </a:p>
@@ -408,7 +413,7 @@
           <a:p>
             <a:fld id="{5B95B4D6-F152-DB46-AA14-3BFE3FA9C9B0}" type="datetimeFigureOut">
               <a:rPr lang="en-US" smtClean="0"/>
-              <a:t>7/28/22</a:t>
+              <a:t>6/7/23</a:t>
             </a:fld>
             <a:endParaRPr lang="en-US"/>
           </a:p>
@@ -588,7 +593,7 @@
           <a:p>
             <a:fld id="{5B95B4D6-F152-DB46-AA14-3BFE3FA9C9B0}" type="datetimeFigureOut">
               <a:rPr lang="en-US" smtClean="0"/>
-              <a:t>7/28/22</a:t>
+              <a:t>6/7/23</a:t>
             </a:fld>
             <a:endParaRPr lang="en-US"/>
           </a:p>
@@ -758,7 +763,7 @@
           <a:p>
             <a:fld id="{5B95B4D6-F152-DB46-AA14-3BFE3FA9C9B0}" type="datetimeFigureOut">
               <a:rPr lang="en-US" smtClean="0"/>
-              <a:t>7/28/22</a:t>
+              <a:t>6/7/23</a:t>
             </a:fld>
             <a:endParaRPr lang="en-US"/>
           </a:p>
@@ -1002,7 +1007,7 @@
           <a:p>
             <a:fld id="{5B95B4D6-F152-DB46-AA14-3BFE3FA9C9B0}" type="datetimeFigureOut">
               <a:rPr lang="en-US" smtClean="0"/>
-              <a:t>7/28/22</a:t>
+              <a:t>6/7/23</a:t>
             </a:fld>
             <a:endParaRPr lang="en-US"/>
           </a:p>
@@ -1234,7 +1239,7 @@
           <a:p>
             <a:fld id="{5B95B4D6-F152-DB46-AA14-3BFE3FA9C9B0}" type="datetimeFigureOut">
               <a:rPr lang="en-US" smtClean="0"/>
-              <a:t>7/28/22</a:t>
+              <a:t>6/7/23</a:t>
             </a:fld>
             <a:endParaRPr lang="en-US"/>
           </a:p>
@@ -1601,7 +1606,7 @@
           <a:p>
             <a:fld id="{5B95B4D6-F152-DB46-AA14-3BFE3FA9C9B0}" type="datetimeFigureOut">
               <a:rPr lang="en-US" smtClean="0"/>
-              <a:t>7/28/22</a:t>
+              <a:t>6/7/23</a:t>
             </a:fld>
             <a:endParaRPr lang="en-US"/>
           </a:p>
@@ -1719,7 +1724,7 @@
           <a:p>
             <a:fld id="{5B95B4D6-F152-DB46-AA14-3BFE3FA9C9B0}" type="datetimeFigureOut">
               <a:rPr lang="en-US" smtClean="0"/>
-              <a:t>7/28/22</a:t>
+              <a:t>6/7/23</a:t>
             </a:fld>
             <a:endParaRPr lang="en-US"/>
           </a:p>
@@ -1814,7 +1819,7 @@
           <a:p>
             <a:fld id="{5B95B4D6-F152-DB46-AA14-3BFE3FA9C9B0}" type="datetimeFigureOut">
               <a:rPr lang="en-US" smtClean="0"/>
-              <a:t>7/28/22</a:t>
+              <a:t>6/7/23</a:t>
             </a:fld>
             <a:endParaRPr lang="en-US"/>
           </a:p>
@@ -2091,7 +2096,7 @@
           <a:p>
             <a:fld id="{5B95B4D6-F152-DB46-AA14-3BFE3FA9C9B0}" type="datetimeFigureOut">
               <a:rPr lang="en-US" smtClean="0"/>
-              <a:t>7/28/22</a:t>
+              <a:t>6/7/23</a:t>
             </a:fld>
             <a:endParaRPr lang="en-US"/>
           </a:p>
@@ -2348,7 +2353,7 @@
           <a:p>
             <a:fld id="{5B95B4D6-F152-DB46-AA14-3BFE3FA9C9B0}" type="datetimeFigureOut">
               <a:rPr lang="en-US" smtClean="0"/>
-              <a:t>7/28/22</a:t>
+              <a:t>6/7/23</a:t>
             </a:fld>
             <a:endParaRPr lang="en-US"/>
           </a:p>
@@ -2561,7 +2566,7 @@
           <a:p>
             <a:fld id="{5B95B4D6-F152-DB46-AA14-3BFE3FA9C9B0}" type="datetimeFigureOut">
               <a:rPr lang="en-US" smtClean="0"/>
-              <a:t>7/28/22</a:t>
+              <a:t>6/7/23</a:t>
             </a:fld>
             <a:endParaRPr lang="en-US"/>
           </a:p>
@@ -5959,10 +5964,10 @@
         </p:nvGrpSpPr>
         <p:grpSpPr>
           <a:xfrm>
-            <a:off x="10400934" y="951073"/>
-            <a:ext cx="2284767" cy="3158220"/>
-            <a:chOff x="10400934" y="951073"/>
-            <a:chExt cx="2284767" cy="3158220"/>
+            <a:off x="10400934" y="951072"/>
+            <a:ext cx="2284767" cy="4409149"/>
+            <a:chOff x="10400934" y="951072"/>
+            <a:chExt cx="2284767" cy="4409149"/>
           </a:xfrm>
         </p:grpSpPr>
         <p:pic>
@@ -6421,8 +6426,8 @@
           </p:nvSpPr>
           <p:spPr>
             <a:xfrm>
-              <a:off x="10482375" y="951073"/>
-              <a:ext cx="2198209" cy="3158220"/>
+              <a:off x="10482375" y="951072"/>
+              <a:ext cx="2198209" cy="4409149"/>
             </a:xfrm>
             <a:prstGeom prst="rect">
               <a:avLst/>
@@ -7927,6 +7932,275 @@
           </a:fontRef>
         </p:style>
       </p:cxnSp>
+      <p:pic>
+        <p:nvPicPr>
+          <p:cNvPr id="1026" name="Picture 2" descr="Amazon SageMaker Introduction – Try Machine Learning with Built-in  Algorithms | devnote">
+            <a:extLst>
+              <a:ext uri="{FF2B5EF4-FFF2-40B4-BE49-F238E27FC236}">
+                <a16:creationId xmlns:a16="http://schemas.microsoft.com/office/drawing/2014/main" id="{52669077-BF4F-CC3A-755E-4E16B5C44656}"/>
+              </a:ext>
+            </a:extLst>
+          </p:cNvPr>
+          <p:cNvPicPr>
+            <a:picLocks noChangeAspect="1" noChangeArrowheads="1"/>
+          </p:cNvPicPr>
+          <p:nvPr/>
+        </p:nvPicPr>
+        <p:blipFill>
+          <a:blip r:embed="rId16">
+            <a:extLst>
+              <a:ext uri="{28A0092B-C50C-407E-A947-70E740481C1C}">
+                <a14:useLocalDpi xmlns:a14="http://schemas.microsoft.com/office/drawing/2010/main" val="0"/>
+              </a:ext>
+            </a:extLst>
+          </a:blip>
+          <a:srcRect/>
+          <a:stretch>
+            <a:fillRect/>
+          </a:stretch>
+        </p:blipFill>
+        <p:spPr bwMode="auto">
+          <a:xfrm>
+            <a:off x="11153265" y="4045711"/>
+            <a:ext cx="779163" cy="779163"/>
+          </a:xfrm>
+          <a:prstGeom prst="rect">
+            <a:avLst/>
+          </a:prstGeom>
+          <a:noFill/>
+          <a:extLst>
+            <a:ext uri="{909E8E84-426E-40DD-AFC4-6F175D3DCCD1}">
+              <a14:hiddenFill xmlns:a14="http://schemas.microsoft.com/office/drawing/2010/main">
+                <a:solidFill>
+                  <a:srgbClr val="FFFFFF"/>
+                </a:solidFill>
+              </a14:hiddenFill>
+            </a:ext>
+          </a:extLst>
+        </p:spPr>
+      </p:pic>
+      <p:sp>
+        <p:nvSpPr>
+          <p:cNvPr id="4" name="TextBox 9">
+            <a:extLst>
+              <a:ext uri="{FF2B5EF4-FFF2-40B4-BE49-F238E27FC236}">
+                <a16:creationId xmlns:a16="http://schemas.microsoft.com/office/drawing/2014/main" id="{AAFFB8E3-7A7A-E909-524C-95FC7B749A30}"/>
+              </a:ext>
+            </a:extLst>
+          </p:cNvPr>
+          <p:cNvSpPr txBox="1">
+            <a:spLocks noChangeArrowheads="1"/>
+          </p:cNvSpPr>
+          <p:nvPr/>
+        </p:nvSpPr>
+        <p:spPr bwMode="auto">
+          <a:xfrm>
+            <a:off x="10464118" y="4806234"/>
+            <a:ext cx="2198209" cy="461665"/>
+          </a:xfrm>
+          <a:prstGeom prst="rect">
+            <a:avLst/>
+          </a:prstGeom>
+          <a:noFill/>
+          <a:ln>
+            <a:noFill/>
+          </a:ln>
+          <a:extLst>
+            <a:ext uri="{909E8E84-426E-40DD-AFC4-6F175D3DCCD1}">
+              <a14:hiddenFill xmlns:a14="http://schemas.microsoft.com/office/drawing/2010/main">
+                <a:solidFill>
+                  <a:srgbClr val="FFFFFF"/>
+                </a:solidFill>
+              </a14:hiddenFill>
+            </a:ext>
+            <a:ext uri="{91240B29-F687-4F45-9708-019B960494DF}">
+              <a14:hiddenLine xmlns:a14="http://schemas.microsoft.com/office/drawing/2010/main" w="9525">
+                <a:solidFill>
+                  <a:srgbClr val="000000"/>
+                </a:solidFill>
+                <a:miter lim="800000"/>
+                <a:headEnd/>
+                <a:tailEnd/>
+              </a14:hiddenLine>
+            </a:ext>
+          </a:extLst>
+        </p:spPr>
+        <p:txBody>
+          <a:bodyPr wrap="square">
+            <a:spAutoFit/>
+          </a:bodyPr>
+          <a:lstStyle>
+            <a:lvl1pPr>
+              <a:defRPr>
+                <a:solidFill>
+                  <a:schemeClr val="tx1"/>
+                </a:solidFill>
+                <a:latin typeface="Calibri" panose="020F0502020204030204" pitchFamily="34" charset="0"/>
+              </a:defRPr>
+            </a:lvl1pPr>
+            <a:lvl2pPr marL="742950" indent="-285750">
+              <a:defRPr>
+                <a:solidFill>
+                  <a:schemeClr val="tx1"/>
+                </a:solidFill>
+                <a:latin typeface="Calibri" panose="020F0502020204030204" pitchFamily="34" charset="0"/>
+              </a:defRPr>
+            </a:lvl2pPr>
+            <a:lvl3pPr marL="1143000" indent="-228600">
+              <a:defRPr>
+                <a:solidFill>
+                  <a:schemeClr val="tx1"/>
+                </a:solidFill>
+                <a:latin typeface="Calibri" panose="020F0502020204030204" pitchFamily="34" charset="0"/>
+              </a:defRPr>
+            </a:lvl3pPr>
+            <a:lvl4pPr marL="1600200" indent="-228600">
+              <a:defRPr>
+                <a:solidFill>
+                  <a:schemeClr val="tx1"/>
+                </a:solidFill>
+                <a:latin typeface="Calibri" panose="020F0502020204030204" pitchFamily="34" charset="0"/>
+              </a:defRPr>
+            </a:lvl4pPr>
+            <a:lvl5pPr marL="2057400" indent="-228600">
+              <a:defRPr>
+                <a:solidFill>
+                  <a:schemeClr val="tx1"/>
+                </a:solidFill>
+                <a:latin typeface="Calibri" panose="020F0502020204030204" pitchFamily="34" charset="0"/>
+              </a:defRPr>
+            </a:lvl5pPr>
+            <a:lvl6pPr marL="2514600" indent="-228600" eaLnBrk="0" fontAlgn="base" hangingPunct="0">
+              <a:spcBef>
+                <a:spcPct val="0"/>
+              </a:spcBef>
+              <a:spcAft>
+                <a:spcPct val="0"/>
+              </a:spcAft>
+              <a:defRPr>
+                <a:solidFill>
+                  <a:schemeClr val="tx1"/>
+                </a:solidFill>
+                <a:latin typeface="Calibri" panose="020F0502020204030204" pitchFamily="34" charset="0"/>
+              </a:defRPr>
+            </a:lvl6pPr>
+            <a:lvl7pPr marL="2971800" indent="-228600" eaLnBrk="0" fontAlgn="base" hangingPunct="0">
+              <a:spcBef>
+                <a:spcPct val="0"/>
+              </a:spcBef>
+              <a:spcAft>
+                <a:spcPct val="0"/>
+              </a:spcAft>
+              <a:defRPr>
+                <a:solidFill>
+                  <a:schemeClr val="tx1"/>
+                </a:solidFill>
+                <a:latin typeface="Calibri" panose="020F0502020204030204" pitchFamily="34" charset="0"/>
+              </a:defRPr>
+            </a:lvl7pPr>
+            <a:lvl8pPr marL="3429000" indent="-228600" eaLnBrk="0" fontAlgn="base" hangingPunct="0">
+              <a:spcBef>
+                <a:spcPct val="0"/>
+              </a:spcBef>
+              <a:spcAft>
+                <a:spcPct val="0"/>
+              </a:spcAft>
+              <a:defRPr>
+                <a:solidFill>
+                  <a:schemeClr val="tx1"/>
+                </a:solidFill>
+                <a:latin typeface="Calibri" panose="020F0502020204030204" pitchFamily="34" charset="0"/>
+              </a:defRPr>
+            </a:lvl8pPr>
+            <a:lvl9pPr marL="3886200" indent="-228600" eaLnBrk="0" fontAlgn="base" hangingPunct="0">
+              <a:spcBef>
+                <a:spcPct val="0"/>
+              </a:spcBef>
+              <a:spcAft>
+                <a:spcPct val="0"/>
+              </a:spcAft>
+              <a:defRPr>
+                <a:solidFill>
+                  <a:schemeClr val="tx1"/>
+                </a:solidFill>
+                <a:latin typeface="Calibri" panose="020F0502020204030204" pitchFamily="34" charset="0"/>
+              </a:defRPr>
+            </a:lvl9pPr>
+          </a:lstStyle>
+          <a:p>
+            <a:pPr algn="ctr" eaLnBrk="1" hangingPunct="1"/>
+            <a:r>
+              <a:rPr lang="en-US" altLang="en-US" sz="1200" dirty="0">
+                <a:latin typeface="Arial" panose="020B0604020202020204" pitchFamily="34" charset="0"/>
+                <a:ea typeface="Amazon Ember" panose="020B0603020204020204" pitchFamily="34" charset="0"/>
+                <a:cs typeface="Arial" panose="020B0604020202020204" pitchFamily="34" charset="0"/>
+              </a:rPr>
+              <a:t>Amazon Bedrock/</a:t>
+            </a:r>
+            <a:br>
+              <a:rPr lang="en-US" altLang="en-US" sz="1200" dirty="0">
+                <a:latin typeface="Arial" panose="020B0604020202020204" pitchFamily="34" charset="0"/>
+                <a:ea typeface="Amazon Ember" panose="020B0603020204020204" pitchFamily="34" charset="0"/>
+                <a:cs typeface="Arial" panose="020B0604020202020204" pitchFamily="34" charset="0"/>
+              </a:rPr>
+            </a:br>
+            <a:r>
+              <a:rPr lang="en-US" altLang="en-US" sz="1200" dirty="0">
+                <a:latin typeface="Arial" panose="020B0604020202020204" pitchFamily="34" charset="0"/>
+                <a:ea typeface="Amazon Ember" panose="020B0603020204020204" pitchFamily="34" charset="0"/>
+                <a:cs typeface="Arial" panose="020B0604020202020204" pitchFamily="34" charset="0"/>
+              </a:rPr>
+              <a:t>LLM</a:t>
+            </a:r>
+          </a:p>
+        </p:txBody>
+      </p:sp>
+      <p:cxnSp>
+        <p:nvCxnSpPr>
+          <p:cNvPr id="7" name="Elbow Connector 6">
+            <a:extLst>
+              <a:ext uri="{FF2B5EF4-FFF2-40B4-BE49-F238E27FC236}">
+                <a16:creationId xmlns:a16="http://schemas.microsoft.com/office/drawing/2014/main" id="{EBFE46F2-CB61-E475-5138-812084C0FBBE}"/>
+              </a:ext>
+            </a:extLst>
+          </p:cNvPr>
+          <p:cNvCxnSpPr>
+            <a:cxnSpLocks/>
+          </p:cNvCxnSpPr>
+          <p:nvPr/>
+        </p:nvCxnSpPr>
+        <p:spPr>
+          <a:xfrm>
+            <a:off x="9263121" y="3526475"/>
+            <a:ext cx="1775780" cy="908818"/>
+          </a:xfrm>
+          <a:prstGeom prst="bentConnector3">
+            <a:avLst>
+              <a:gd name="adj1" fmla="val 92"/>
+            </a:avLst>
+          </a:prstGeom>
+          <a:ln w="19050">
+            <a:solidFill>
+              <a:schemeClr val="tx1"/>
+            </a:solidFill>
+            <a:tailEnd type="stealth" w="lg" len="lg"/>
+          </a:ln>
+        </p:spPr>
+        <p:style>
+          <a:lnRef idx="1">
+            <a:schemeClr val="accent1"/>
+          </a:lnRef>
+          <a:fillRef idx="0">
+            <a:schemeClr val="accent1"/>
+          </a:fillRef>
+          <a:effectRef idx="0">
+            <a:schemeClr val="accent1"/>
+          </a:effectRef>
+          <a:fontRef idx="minor">
+            <a:schemeClr val="tx1"/>
+          </a:fontRef>
+        </p:style>
+      </p:cxnSp>
     </p:spTree>
     <p:extLst>
       <p:ext uri="{BB962C8B-B14F-4D97-AF65-F5344CB8AC3E}">

</xml_diff>